<commit_message>
Update Image Compression by K Means Clustering.pptx
</commit_message>
<xml_diff>
--- a/Image Compression by K Means Clustering.pptx
+++ b/Image Compression by K Means Clustering.pptx
@@ -20,6 +20,7 @@
     <p:sldId id="275" r:id="rId14"/>
     <p:sldId id="276" r:id="rId15"/>
     <p:sldId id="273" r:id="rId16"/>
+    <p:sldId id="277" r:id="rId17"/>
   </p:sldIdLst>
   <p:sldSz cx="12192000" cy="6858000"/>
   <p:notesSz cx="6858000" cy="9144000"/>
@@ -118,13 +119,18 @@
       </a:defRPr>
     </a:lvl9pPr>
   </p:defaultTextStyle>
+  <p:extLst>
+    <p:ext uri="{EFAFB233-063F-42B5-8137-9DF3F51BA10A}">
+      <p15:sldGuideLst xmlns:p15="http://schemas.microsoft.com/office/powerpoint/2012/main"/>
+    </p:ext>
+  </p:extLst>
 </p:presentation>
 </file>
 
 <file path=ppt/revisionInfo.xml><?xml version="1.0" encoding="utf-8"?>
 <p1510:revInfo xmlns:a="http://schemas.openxmlformats.org/drawingml/2006/main" xmlns:r="http://schemas.openxmlformats.org/officeDocument/2006/relationships" xmlns:p1510="http://schemas.microsoft.com/office/powerpoint/2015/10/main">
   <p1510:revLst>
-    <p1510:client id="{FE22CAD0-663D-4286-8957-3DD136FE9A56}" v="87" dt="2021-12-02T00:09:45.242"/>
+    <p1510:client id="{FE22CAD0-663D-4286-8957-3DD136FE9A56}" v="88" dt="2021-12-06T23:38:59.516"/>
   </p1510:revLst>
 </p1510:revInfo>
 </file>
@@ -134,7 +140,7 @@
   <pc:docChgLst>
     <pc:chgData name="Austin Gay" userId="436f17eb806f5125" providerId="LiveId" clId="{FE22CAD0-663D-4286-8957-3DD136FE9A56}"/>
     <pc:docChg chg="undo custSel addSld delSld modSld sldOrd addMainMaster delMainMaster">
-      <pc:chgData name="Austin Gay" userId="436f17eb806f5125" providerId="LiveId" clId="{FE22CAD0-663D-4286-8957-3DD136FE9A56}" dt="2021-12-02T00:12:56.847" v="3698" actId="20577"/>
+      <pc:chgData name="Austin Gay" userId="436f17eb806f5125" providerId="LiveId" clId="{FE22CAD0-663D-4286-8957-3DD136FE9A56}" dt="2021-12-06T23:39:20.151" v="3750" actId="1076"/>
       <pc:docMkLst>
         <pc:docMk/>
       </pc:docMkLst>
@@ -586,7 +592,7 @@
         </pc:cxnChg>
       </pc:sldChg>
       <pc:sldChg chg="modSp new mod">
-        <pc:chgData name="Austin Gay" userId="436f17eb806f5125" providerId="LiveId" clId="{FE22CAD0-663D-4286-8957-3DD136FE9A56}" dt="2021-12-01T20:24:29.814" v="1396" actId="20577"/>
+        <pc:chgData name="Austin Gay" userId="436f17eb806f5125" providerId="LiveId" clId="{FE22CAD0-663D-4286-8957-3DD136FE9A56}" dt="2021-12-06T23:35:29.175" v="3731" actId="20577"/>
         <pc:sldMkLst>
           <pc:docMk/>
           <pc:sldMk cId="11217671" sldId="257"/>
@@ -600,7 +606,7 @@
           </ac:spMkLst>
         </pc:spChg>
         <pc:spChg chg="mod">
-          <ac:chgData name="Austin Gay" userId="436f17eb806f5125" providerId="LiveId" clId="{FE22CAD0-663D-4286-8957-3DD136FE9A56}" dt="2021-12-01T20:24:29.814" v="1396" actId="20577"/>
+          <ac:chgData name="Austin Gay" userId="436f17eb806f5125" providerId="LiveId" clId="{FE22CAD0-663D-4286-8957-3DD136FE9A56}" dt="2021-12-06T23:35:29.175" v="3731" actId="20577"/>
           <ac:spMkLst>
             <pc:docMk/>
             <pc:sldMk cId="11217671" sldId="257"/>
@@ -1226,11 +1232,19 @@
         </pc:picChg>
       </pc:sldChg>
       <pc:sldChg chg="addSp delSp modSp add mod">
-        <pc:chgData name="Austin Gay" userId="436f17eb806f5125" providerId="LiveId" clId="{FE22CAD0-663D-4286-8957-3DD136FE9A56}" dt="2021-12-01T21:08:33.208" v="3062" actId="1037"/>
+        <pc:chgData name="Austin Gay" userId="436f17eb806f5125" providerId="LiveId" clId="{FE22CAD0-663D-4286-8957-3DD136FE9A56}" dt="2021-12-06T23:39:20.151" v="3750" actId="1076"/>
         <pc:sldMkLst>
           <pc:docMk/>
           <pc:sldMk cId="1389276907" sldId="272"/>
         </pc:sldMkLst>
+        <pc:spChg chg="add mod">
+          <ac:chgData name="Austin Gay" userId="436f17eb806f5125" providerId="LiveId" clId="{FE22CAD0-663D-4286-8957-3DD136FE9A56}" dt="2021-12-06T23:39:20.151" v="3750" actId="1076"/>
+          <ac:spMkLst>
+            <pc:docMk/>
+            <pc:sldMk cId="1389276907" sldId="272"/>
+            <ac:spMk id="6" creationId="{F02E6136-193F-444B-BBE9-67FAD7D5C408}"/>
+          </ac:spMkLst>
+        </pc:spChg>
         <pc:spChg chg="add mod">
           <ac:chgData name="Austin Gay" userId="436f17eb806f5125" providerId="LiveId" clId="{FE22CAD0-663D-4286-8957-3DD136FE9A56}" dt="2021-12-01T21:07:26.731" v="3035" actId="1076"/>
           <ac:spMkLst>
@@ -2727,7 +2741,7 @@
           <a:p>
             <a:fld id="{0D4E46AA-1EC0-4433-9956-E798E94A6FB7}" type="datetimeFigureOut">
               <a:rPr lang="en-US" smtClean="0"/>
-              <a:t>12/1/2021</a:t>
+              <a:t>12/9/2021</a:t>
             </a:fld>
             <a:endParaRPr lang="en-US"/>
           </a:p>
@@ -2925,7 +2939,7 @@
           <a:p>
             <a:fld id="{0D4E46AA-1EC0-4433-9956-E798E94A6FB7}" type="datetimeFigureOut">
               <a:rPr lang="en-US" smtClean="0"/>
-              <a:t>12/1/2021</a:t>
+              <a:t>12/9/2021</a:t>
             </a:fld>
             <a:endParaRPr lang="en-US"/>
           </a:p>
@@ -3133,7 +3147,7 @@
           <a:p>
             <a:fld id="{0D4E46AA-1EC0-4433-9956-E798E94A6FB7}" type="datetimeFigureOut">
               <a:rPr lang="en-US" smtClean="0"/>
-              <a:t>12/1/2021</a:t>
+              <a:t>12/9/2021</a:t>
             </a:fld>
             <a:endParaRPr lang="en-US"/>
           </a:p>
@@ -5553,7 +5567,7 @@
           <a:p>
             <a:fld id="{3C04E684-10F4-4CC3-A0B9-F03AA7BE37CF}" type="datetimeFigureOut">
               <a:rPr lang="en-US" smtClean="0"/>
-              <a:t>12/1/2021</a:t>
+              <a:t>12/9/2021</a:t>
             </a:fld>
             <a:endParaRPr lang="en-US"/>
           </a:p>
@@ -6290,7 +6304,7 @@
           <a:p>
             <a:fld id="{3C04E684-10F4-4CC3-A0B9-F03AA7BE37CF}" type="datetimeFigureOut">
               <a:rPr lang="en-US" smtClean="0"/>
-              <a:t>12/1/2021</a:t>
+              <a:t>12/9/2021</a:t>
             </a:fld>
             <a:endParaRPr lang="en-US"/>
           </a:p>
@@ -6932,7 +6946,7 @@
           <a:p>
             <a:fld id="{3C04E684-10F4-4CC3-A0B9-F03AA7BE37CF}" type="datetimeFigureOut">
               <a:rPr lang="en-US" smtClean="0"/>
-              <a:t>12/1/2021</a:t>
+              <a:t>12/9/2021</a:t>
             </a:fld>
             <a:endParaRPr lang="en-US"/>
           </a:p>
@@ -7732,7 +7746,7 @@
           <a:p>
             <a:fld id="{3C04E684-10F4-4CC3-A0B9-F03AA7BE37CF}" type="datetimeFigureOut">
               <a:rPr lang="en-US" smtClean="0"/>
-              <a:t>12/1/2021</a:t>
+              <a:t>12/9/2021</a:t>
             </a:fld>
             <a:endParaRPr lang="en-US"/>
           </a:p>
@@ -8683,7 +8697,7 @@
           <a:p>
             <a:fld id="{3C04E684-10F4-4CC3-A0B9-F03AA7BE37CF}" type="datetimeFigureOut">
               <a:rPr lang="en-US" smtClean="0"/>
-              <a:t>12/1/2021</a:t>
+              <a:t>12/9/2021</a:t>
             </a:fld>
             <a:endParaRPr lang="en-US"/>
           </a:p>
@@ -11032,7 +11046,7 @@
           <a:p>
             <a:fld id="{3C04E684-10F4-4CC3-A0B9-F03AA7BE37CF}" type="datetimeFigureOut">
               <a:rPr lang="en-US" smtClean="0"/>
-              <a:t>12/1/2021</a:t>
+              <a:t>12/9/2021</a:t>
             </a:fld>
             <a:endParaRPr lang="en-US"/>
           </a:p>
@@ -11145,7 +11159,7 @@
           <a:p>
             <a:fld id="{3C04E684-10F4-4CC3-A0B9-F03AA7BE37CF}" type="datetimeFigureOut">
               <a:rPr lang="en-US" smtClean="0"/>
-              <a:t>12/1/2021</a:t>
+              <a:t>12/9/2021</a:t>
             </a:fld>
             <a:endParaRPr lang="en-US"/>
           </a:p>
@@ -11652,7 +11666,7 @@
           <a:p>
             <a:fld id="{3C04E684-10F4-4CC3-A0B9-F03AA7BE37CF}" type="datetimeFigureOut">
               <a:rPr lang="en-US" smtClean="0"/>
-              <a:t>12/1/2021</a:t>
+              <a:t>12/9/2021</a:t>
             </a:fld>
             <a:endParaRPr lang="en-US"/>
           </a:p>
@@ -11850,7 +11864,7 @@
           <a:p>
             <a:fld id="{0D4E46AA-1EC0-4433-9956-E798E94A6FB7}" type="datetimeFigureOut">
               <a:rPr lang="en-US" smtClean="0"/>
-              <a:t>12/1/2021</a:t>
+              <a:t>12/9/2021</a:t>
             </a:fld>
             <a:endParaRPr lang="en-US"/>
           </a:p>
@@ -13153,7 +13167,7 @@
           <a:p>
             <a:fld id="{3C04E684-10F4-4CC3-A0B9-F03AA7BE37CF}" type="datetimeFigureOut">
               <a:rPr lang="en-US" smtClean="0"/>
-              <a:t>12/1/2021</a:t>
+              <a:t>12/9/2021</a:t>
             </a:fld>
             <a:endParaRPr lang="en-US"/>
           </a:p>
@@ -15647,7 +15661,7 @@
           <a:p>
             <a:fld id="{3C04E684-10F4-4CC3-A0B9-F03AA7BE37CF}" type="datetimeFigureOut">
               <a:rPr lang="en-US" smtClean="0"/>
-              <a:t>12/1/2021</a:t>
+              <a:t>12/9/2021</a:t>
             </a:fld>
             <a:endParaRPr lang="en-US"/>
           </a:p>
@@ -15845,7 +15859,7 @@
           <a:p>
             <a:fld id="{3C04E684-10F4-4CC3-A0B9-F03AA7BE37CF}" type="datetimeFigureOut">
               <a:rPr lang="en-US" smtClean="0"/>
-              <a:t>12/1/2021</a:t>
+              <a:t>12/9/2021</a:t>
             </a:fld>
             <a:endParaRPr lang="en-US"/>
           </a:p>
@@ -16053,7 +16067,7 @@
           <a:p>
             <a:fld id="{3C04E684-10F4-4CC3-A0B9-F03AA7BE37CF}" type="datetimeFigureOut">
               <a:rPr lang="en-US" smtClean="0"/>
-              <a:t>12/1/2021</a:t>
+              <a:t>12/9/2021</a:t>
             </a:fld>
             <a:endParaRPr lang="en-US"/>
           </a:p>
@@ -16332,7 +16346,7 @@
           <a:p>
             <a:fld id="{0D4E46AA-1EC0-4433-9956-E798E94A6FB7}" type="datetimeFigureOut">
               <a:rPr lang="en-US" smtClean="0"/>
-              <a:t>12/1/2021</a:t>
+              <a:t>12/9/2021</a:t>
             </a:fld>
             <a:endParaRPr lang="en-US"/>
           </a:p>
@@ -16597,7 +16611,7 @@
           <a:p>
             <a:fld id="{0D4E46AA-1EC0-4433-9956-E798E94A6FB7}" type="datetimeFigureOut">
               <a:rPr lang="en-US" smtClean="0"/>
-              <a:t>12/1/2021</a:t>
+              <a:t>12/9/2021</a:t>
             </a:fld>
             <a:endParaRPr lang="en-US"/>
           </a:p>
@@ -17013,7 +17027,7 @@
           <a:p>
             <a:fld id="{0D4E46AA-1EC0-4433-9956-E798E94A6FB7}" type="datetimeFigureOut">
               <a:rPr lang="en-US" smtClean="0"/>
-              <a:t>12/1/2021</a:t>
+              <a:t>12/9/2021</a:t>
             </a:fld>
             <a:endParaRPr lang="en-US"/>
           </a:p>
@@ -17154,7 +17168,7 @@
           <a:p>
             <a:fld id="{0D4E46AA-1EC0-4433-9956-E798E94A6FB7}" type="datetimeFigureOut">
               <a:rPr lang="en-US" smtClean="0"/>
-              <a:t>12/1/2021</a:t>
+              <a:t>12/9/2021</a:t>
             </a:fld>
             <a:endParaRPr lang="en-US"/>
           </a:p>
@@ -17267,7 +17281,7 @@
           <a:p>
             <a:fld id="{0D4E46AA-1EC0-4433-9956-E798E94A6FB7}" type="datetimeFigureOut">
               <a:rPr lang="en-US" smtClean="0"/>
-              <a:t>12/1/2021</a:t>
+              <a:t>12/9/2021</a:t>
             </a:fld>
             <a:endParaRPr lang="en-US"/>
           </a:p>
@@ -17580,7 +17594,7 @@
           <a:p>
             <a:fld id="{0D4E46AA-1EC0-4433-9956-E798E94A6FB7}" type="datetimeFigureOut">
               <a:rPr lang="en-US" smtClean="0"/>
-              <a:t>12/1/2021</a:t>
+              <a:t>12/9/2021</a:t>
             </a:fld>
             <a:endParaRPr lang="en-US"/>
           </a:p>
@@ -17868,7 +17882,7 @@
           <a:p>
             <a:fld id="{0D4E46AA-1EC0-4433-9956-E798E94A6FB7}" type="datetimeFigureOut">
               <a:rPr lang="en-US" smtClean="0"/>
-              <a:t>12/1/2021</a:t>
+              <a:t>12/9/2021</a:t>
             </a:fld>
             <a:endParaRPr lang="en-US"/>
           </a:p>
@@ -18108,7 +18122,7 @@
             <a:fld id="{0D4E46AA-1EC0-4433-9956-E798E94A6FB7}" type="datetimeFigureOut">
               <a:rPr lang="en-US" smtClean="0"/>
               <a:pPr/>
-              <a:t>12/1/2021</a:t>
+              <a:t>12/9/2021</a:t>
             </a:fld>
             <a:endParaRPr lang="en-US" dirty="0"/>
           </a:p>
@@ -18719,7 +18733,7 @@
           <a:p>
             <a:fld id="{3C04E684-10F4-4CC3-A0B9-F03AA7BE37CF}" type="datetimeFigureOut">
               <a:rPr lang="en-US" smtClean="0"/>
-              <a:t>12/1/2021</a:t>
+              <a:t>12/9/2021</a:t>
             </a:fld>
             <a:endParaRPr lang="en-US"/>
           </a:p>
@@ -19336,8 +19350,8 @@
         </p:nvSpPr>
         <p:spPr>
           <a:xfrm>
-            <a:off x="3855525" y="1371600"/>
-            <a:ext cx="7461752" cy="2696866"/>
+            <a:off x="5844987" y="1371600"/>
+            <a:ext cx="5472289" cy="2696866"/>
           </a:xfrm>
         </p:spPr>
         <p:txBody>
@@ -19353,7 +19367,7 @@
                   <a:srgbClr val="FFFFFF"/>
                 </a:solidFill>
               </a:rPr>
-              <a:t>Image Compression by K-Means Clustering Algorithm</a:t>
+              <a:t>Image Compression by K-Means Clustering</a:t>
             </a:r>
           </a:p>
         </p:txBody>
@@ -19611,6 +19625,41 @@
           </a:prstGeom>
         </p:spPr>
       </p:pic>
+      <p:sp>
+        <p:nvSpPr>
+          <p:cNvPr id="6" name="TextBox 5">
+            <a:extLst>
+              <a:ext uri="{FF2B5EF4-FFF2-40B4-BE49-F238E27FC236}">
+                <a16:creationId xmlns:a16="http://schemas.microsoft.com/office/drawing/2014/main" id="{F02E6136-193F-444B-BBE9-67FAD7D5C408}"/>
+              </a:ext>
+            </a:extLst>
+          </p:cNvPr>
+          <p:cNvSpPr txBox="1"/>
+          <p:nvPr/>
+        </p:nvSpPr>
+        <p:spPr>
+          <a:xfrm>
+            <a:off x="7442250" y="2934416"/>
+            <a:ext cx="1388192" cy="369332"/>
+          </a:xfrm>
+          <a:prstGeom prst="rect">
+            <a:avLst/>
+          </a:prstGeom>
+          <a:noFill/>
+        </p:spPr>
+        <p:txBody>
+          <a:bodyPr wrap="square" rtlCol="0">
+            <a:spAutoFit/>
+          </a:bodyPr>
+          <a:lstStyle/>
+          <a:p>
+            <a:r>
+              <a:rPr lang="en-US" dirty="0"/>
+              <a:t>25 Clusters</a:t>
+            </a:r>
+          </a:p>
+        </p:txBody>
+      </p:sp>
     </p:spTree>
     <p:extLst>
       <p:ext uri="{BB962C8B-B14F-4D97-AF65-F5344CB8AC3E}">
@@ -20364,6 +20413,104 @@
 </p:sld>
 </file>
 
+<file path=ppt/slides/slide15.xml><?xml version="1.0" encoding="utf-8"?>
+<p:sld xmlns:a="http://schemas.openxmlformats.org/drawingml/2006/main" xmlns:r="http://schemas.openxmlformats.org/officeDocument/2006/relationships" xmlns:p="http://schemas.openxmlformats.org/presentationml/2006/main">
+  <p:cSld>
+    <p:spTree>
+      <p:nvGrpSpPr>
+        <p:cNvPr id="1" name=""/>
+        <p:cNvGrpSpPr/>
+        <p:nvPr/>
+      </p:nvGrpSpPr>
+      <p:grpSpPr>
+        <a:xfrm>
+          <a:off x="0" y="0"/>
+          <a:ext cx="0" cy="0"/>
+          <a:chOff x="0" y="0"/>
+          <a:chExt cx="0" cy="0"/>
+        </a:xfrm>
+      </p:grpSpPr>
+      <p:sp>
+        <p:nvSpPr>
+          <p:cNvPr id="2" name="Title 1">
+            <a:extLst>
+              <a:ext uri="{FF2B5EF4-FFF2-40B4-BE49-F238E27FC236}">
+                <a16:creationId xmlns:a16="http://schemas.microsoft.com/office/drawing/2014/main" id="{1745C9A4-0377-47AB-91AE-298E44118E15}"/>
+              </a:ext>
+            </a:extLst>
+          </p:cNvPr>
+          <p:cNvSpPr>
+            <a:spLocks noGrp="1"/>
+          </p:cNvSpPr>
+          <p:nvPr>
+            <p:ph type="title"/>
+          </p:nvPr>
+        </p:nvSpPr>
+        <p:spPr/>
+        <p:txBody>
+          <a:bodyPr/>
+          <a:lstStyle/>
+          <a:p>
+            <a:r>
+              <a:rPr lang="en-US" dirty="0"/>
+              <a:t>Future Work</a:t>
+            </a:r>
+          </a:p>
+        </p:txBody>
+      </p:sp>
+      <p:sp>
+        <p:nvSpPr>
+          <p:cNvPr id="3" name="Content Placeholder 2">
+            <a:extLst>
+              <a:ext uri="{FF2B5EF4-FFF2-40B4-BE49-F238E27FC236}">
+                <a16:creationId xmlns:a16="http://schemas.microsoft.com/office/drawing/2014/main" id="{7CC2469F-8BD8-4E18-86F4-725D99AF6079}"/>
+              </a:ext>
+            </a:extLst>
+          </p:cNvPr>
+          <p:cNvSpPr>
+            <a:spLocks noGrp="1"/>
+          </p:cNvSpPr>
+          <p:nvPr>
+            <p:ph idx="1"/>
+          </p:nvPr>
+        </p:nvSpPr>
+        <p:spPr/>
+        <p:txBody>
+          <a:bodyPr/>
+          <a:lstStyle/>
+          <a:p>
+            <a:r>
+              <a:rPr lang="en-US" dirty="0"/>
+              <a:t>RGB Pictures</a:t>
+            </a:r>
+          </a:p>
+          <a:p>
+            <a:r>
+              <a:rPr lang="en-US" dirty="0"/>
+              <a:t>Compare Sub-Image Method to Individual Pixel Method</a:t>
+            </a:r>
+          </a:p>
+          <a:p>
+            <a:r>
+              <a:rPr lang="en-US" dirty="0"/>
+              <a:t>Instead of eyesight, use classification to determine if a picture retained its contents after image compression</a:t>
+            </a:r>
+          </a:p>
+        </p:txBody>
+      </p:sp>
+    </p:spTree>
+    <p:extLst>
+      <p:ext uri="{BB962C8B-B14F-4D97-AF65-F5344CB8AC3E}">
+        <p14:creationId xmlns:p14="http://schemas.microsoft.com/office/powerpoint/2010/main" val="1257586382"/>
+      </p:ext>
+    </p:extLst>
+  </p:cSld>
+  <p:clrMapOvr>
+    <a:masterClrMapping/>
+  </p:clrMapOvr>
+</p:sld>
+</file>
+
 <file path=ppt/slides/slide2.xml><?xml version="1.0" encoding="utf-8"?>
 <p:sld xmlns:a="http://schemas.openxmlformats.org/drawingml/2006/main" xmlns:r="http://schemas.openxmlformats.org/officeDocument/2006/relationships" xmlns:p="http://schemas.openxmlformats.org/presentationml/2006/main">
   <p:cSld>
@@ -20544,7 +20691,7 @@
           <a:p>
             <a:r>
               <a:rPr lang="en-US" dirty="0"/>
-              <a:t>Looks for k clusters in a dataset with the means as the center of the clusters (centroids)</a:t>
+              <a:t>Looks for k clusters in a dataset (mean/centroid)</a:t>
             </a:r>
           </a:p>
           <a:p>
@@ -20680,8 +20827,8 @@
           </a:p>
         </p:txBody>
       </p:sp>
-      <mc:AlternateContent xmlns:mc="http://schemas.openxmlformats.org/markup-compatibility/2006">
-        <mc:Choice xmlns:a14="http://schemas.microsoft.com/office/drawing/2010/main" Requires="a14">
+      <mc:AlternateContent xmlns:mc="http://schemas.openxmlformats.org/markup-compatibility/2006" xmlns:a14="http://schemas.microsoft.com/office/drawing/2010/main">
+        <mc:Choice Requires="a14">
           <p:graphicFrame>
             <p:nvGraphicFramePr>
               <p:cNvPr id="6" name="Table 5">
@@ -20732,6 +20879,7 @@
                         <a:bodyPr/>
                         <a:lstStyle/>
                         <a:p>
+                          <a:pPr/>
                           <a14:m>
                             <m:oMathPara xmlns:m="http://schemas.openxmlformats.org/officeDocument/2006/math">
                               <m:oMathParaPr>
@@ -20807,6 +20955,7 @@
                         <a:bodyPr/>
                         <a:lstStyle/>
                         <a:p>
+                          <a:pPr/>
                           <a14:m>
                             <m:oMathPara xmlns:m="http://schemas.openxmlformats.org/officeDocument/2006/math">
                               <m:oMathParaPr>
@@ -20886,6 +21035,7 @@
                         <a:bodyPr/>
                         <a:lstStyle/>
                         <a:p>
+                          <a:pPr/>
                           <a14:m>
                             <m:oMathPara xmlns:m="http://schemas.openxmlformats.org/officeDocument/2006/math">
                               <m:oMathParaPr>
@@ -20958,6 +21108,7 @@
                         <a:bodyPr/>
                         <a:lstStyle/>
                         <a:p>
+                          <a:pPr/>
                           <a14:m>
                             <m:oMathPara xmlns:m="http://schemas.openxmlformats.org/officeDocument/2006/math">
                               <m:oMathParaPr>
@@ -21036,7 +21187,7 @@
             </a:graphic>
           </p:graphicFrame>
         </mc:Choice>
-        <mc:Fallback>
+        <mc:Fallback xmlns="">
           <p:graphicFrame>
             <p:nvGraphicFramePr>
               <p:cNvPr id="6" name="Table 5">
@@ -21280,8 +21431,8 @@
           </p:graphicFrame>
         </mc:Fallback>
       </mc:AlternateContent>
-      <mc:AlternateContent xmlns:mc="http://schemas.openxmlformats.org/markup-compatibility/2006">
-        <mc:Choice xmlns:a14="http://schemas.microsoft.com/office/drawing/2010/main" Requires="a14">
+      <mc:AlternateContent xmlns:mc="http://schemas.openxmlformats.org/markup-compatibility/2006" xmlns:a14="http://schemas.microsoft.com/office/drawing/2010/main">
+        <mc:Choice Requires="a14">
           <p:graphicFrame>
             <p:nvGraphicFramePr>
               <p:cNvPr id="10" name="Table 9">
@@ -21332,6 +21483,7 @@
                         <a:bodyPr/>
                         <a:lstStyle/>
                         <a:p>
+                          <a:pPr/>
                           <a14:m>
                             <m:oMathPara xmlns:m="http://schemas.openxmlformats.org/officeDocument/2006/math">
                               <m:oMathParaPr>
@@ -21407,6 +21559,7 @@
                         <a:bodyPr/>
                         <a:lstStyle/>
                         <a:p>
+                          <a:pPr/>
                           <a14:m>
                             <m:oMathPara xmlns:m="http://schemas.openxmlformats.org/officeDocument/2006/math">
                               <m:oMathParaPr>
@@ -21486,6 +21639,7 @@
                         <a:bodyPr/>
                         <a:lstStyle/>
                         <a:p>
+                          <a:pPr/>
                           <a14:m>
                             <m:oMathPara xmlns:m="http://schemas.openxmlformats.org/officeDocument/2006/math">
                               <m:oMathParaPr>
@@ -21558,6 +21712,7 @@
                         <a:bodyPr/>
                         <a:lstStyle/>
                         <a:p>
+                          <a:pPr/>
                           <a14:m>
                             <m:oMathPara xmlns:m="http://schemas.openxmlformats.org/officeDocument/2006/math">
                               <m:oMathParaPr>
@@ -21636,7 +21791,7 @@
             </a:graphic>
           </p:graphicFrame>
         </mc:Choice>
-        <mc:Fallback>
+        <mc:Fallback xmlns="">
           <p:graphicFrame>
             <p:nvGraphicFramePr>
               <p:cNvPr id="10" name="Table 9">

</xml_diff>